<commit_message>
Ajout du diagramme de classe
</commit_message>
<xml_diff>
--- a/presentation.pptx
+++ b/presentation.pptx
@@ -111,6 +111,11 @@
       </a:defRPr>
     </a:lvl9pPr>
   </p:defaultTextStyle>
+  <p:extLst>
+    <p:ext uri="{EFAFB233-063F-42B5-8137-9DF3F51BA10A}">
+      <p15:sldGuideLst xmlns:p15="http://schemas.microsoft.com/office/powerpoint/2012/main"/>
+    </p:ext>
+  </p:extLst>
 </p:presentation>
 </file>
 
@@ -299,7 +304,7 @@
           <a:p>
             <a:fld id="{2D5AC94A-39C5-4978-AAAE-8C77D16AD6DD}" type="datetimeFigureOut">
               <a:rPr lang="fr-FR" smtClean="0"/>
-              <a:t>21/04/2018</a:t>
+              <a:t>22/04/2018</a:t>
             </a:fld>
             <a:endParaRPr lang="fr-FR"/>
           </a:p>
@@ -341,7 +346,7 @@
           <a:p>
             <a:fld id="{6B043D1A-49E2-47B3-8AC0-9106DF2E9A6B}" type="slidenum">
               <a:rPr lang="fr-FR" smtClean="0"/>
-              <a:t>‹N°›</a:t>
+              <a:t>‹#›</a:t>
             </a:fld>
             <a:endParaRPr lang="fr-FR"/>
           </a:p>
@@ -597,7 +602,7 @@
           <a:p>
             <a:fld id="{2D5AC94A-39C5-4978-AAAE-8C77D16AD6DD}" type="datetimeFigureOut">
               <a:rPr lang="fr-FR" smtClean="0"/>
-              <a:t>21/04/2018</a:t>
+              <a:t>22/04/2018</a:t>
             </a:fld>
             <a:endParaRPr lang="fr-FR"/>
           </a:p>
@@ -639,7 +644,7 @@
           <a:p>
             <a:fld id="{6B043D1A-49E2-47B3-8AC0-9106DF2E9A6B}" type="slidenum">
               <a:rPr lang="fr-FR" smtClean="0"/>
-              <a:t>‹N°›</a:t>
+              <a:t>‹#›</a:t>
             </a:fld>
             <a:endParaRPr lang="fr-FR"/>
           </a:p>
@@ -789,7 +794,7 @@
           <a:p>
             <a:fld id="{2D5AC94A-39C5-4978-AAAE-8C77D16AD6DD}" type="datetimeFigureOut">
               <a:rPr lang="fr-FR" smtClean="0"/>
-              <a:t>21/04/2018</a:t>
+              <a:t>22/04/2018</a:t>
             </a:fld>
             <a:endParaRPr lang="fr-FR"/>
           </a:p>
@@ -831,7 +836,7 @@
           <a:p>
             <a:fld id="{6B043D1A-49E2-47B3-8AC0-9106DF2E9A6B}" type="slidenum">
               <a:rPr lang="fr-FR" smtClean="0"/>
-              <a:t>‹N°›</a:t>
+              <a:t>‹#›</a:t>
             </a:fld>
             <a:endParaRPr lang="fr-FR"/>
           </a:p>
@@ -1050,7 +1055,7 @@
           <a:p>
             <a:fld id="{2D5AC94A-39C5-4978-AAAE-8C77D16AD6DD}" type="datetimeFigureOut">
               <a:rPr lang="fr-FR" smtClean="0"/>
-              <a:t>21/04/2018</a:t>
+              <a:t>22/04/2018</a:t>
             </a:fld>
             <a:endParaRPr lang="fr-FR"/>
           </a:p>
@@ -1092,7 +1097,7 @@
           <a:p>
             <a:fld id="{6B043D1A-49E2-47B3-8AC0-9106DF2E9A6B}" type="slidenum">
               <a:rPr lang="fr-FR" smtClean="0"/>
-              <a:t>‹N°›</a:t>
+              <a:t>‹#›</a:t>
             </a:fld>
             <a:endParaRPr lang="fr-FR"/>
           </a:p>
@@ -1474,7 +1479,7 @@
           <a:p>
             <a:fld id="{2D5AC94A-39C5-4978-AAAE-8C77D16AD6DD}" type="datetimeFigureOut">
               <a:rPr lang="fr-FR" smtClean="0"/>
-              <a:t>21/04/2018</a:t>
+              <a:t>22/04/2018</a:t>
             </a:fld>
             <a:endParaRPr lang="fr-FR"/>
           </a:p>
@@ -1516,7 +1521,7 @@
           <a:p>
             <a:fld id="{6B043D1A-49E2-47B3-8AC0-9106DF2E9A6B}" type="slidenum">
               <a:rPr lang="fr-FR" smtClean="0"/>
-              <a:t>‹N°›</a:t>
+              <a:t>‹#›</a:t>
             </a:fld>
             <a:endParaRPr lang="fr-FR"/>
           </a:p>
@@ -2011,7 +2016,7 @@
           <a:p>
             <a:fld id="{2D5AC94A-39C5-4978-AAAE-8C77D16AD6DD}" type="datetimeFigureOut">
               <a:rPr lang="fr-FR" smtClean="0"/>
-              <a:t>21/04/2018</a:t>
+              <a:t>22/04/2018</a:t>
             </a:fld>
             <a:endParaRPr lang="fr-FR"/>
           </a:p>
@@ -2053,7 +2058,7 @@
           <a:p>
             <a:fld id="{6B043D1A-49E2-47B3-8AC0-9106DF2E9A6B}" type="slidenum">
               <a:rPr lang="fr-FR" smtClean="0"/>
-              <a:t>‹N°›</a:t>
+              <a:t>‹#›</a:t>
             </a:fld>
             <a:endParaRPr lang="fr-FR"/>
           </a:p>
@@ -2875,7 +2880,7 @@
           <a:p>
             <a:fld id="{2D5AC94A-39C5-4978-AAAE-8C77D16AD6DD}" type="datetimeFigureOut">
               <a:rPr lang="fr-FR" smtClean="0"/>
-              <a:t>21/04/2018</a:t>
+              <a:t>22/04/2018</a:t>
             </a:fld>
             <a:endParaRPr lang="fr-FR"/>
           </a:p>
@@ -2917,7 +2922,7 @@
           <a:p>
             <a:fld id="{6B043D1A-49E2-47B3-8AC0-9106DF2E9A6B}" type="slidenum">
               <a:rPr lang="fr-FR" smtClean="0"/>
-              <a:t>‹N°›</a:t>
+              <a:t>‹#›</a:t>
             </a:fld>
             <a:endParaRPr lang="fr-FR"/>
           </a:p>
@@ -3045,7 +3050,7 @@
           <a:p>
             <a:fld id="{2D5AC94A-39C5-4978-AAAE-8C77D16AD6DD}" type="datetimeFigureOut">
               <a:rPr lang="fr-FR" smtClean="0"/>
-              <a:t>21/04/2018</a:t>
+              <a:t>22/04/2018</a:t>
             </a:fld>
             <a:endParaRPr lang="fr-FR"/>
           </a:p>
@@ -3087,7 +3092,7 @@
           <a:p>
             <a:fld id="{6B043D1A-49E2-47B3-8AC0-9106DF2E9A6B}" type="slidenum">
               <a:rPr lang="fr-FR" smtClean="0"/>
-              <a:t>‹N°›</a:t>
+              <a:t>‹#›</a:t>
             </a:fld>
             <a:endParaRPr lang="fr-FR"/>
           </a:p>
@@ -3229,7 +3234,7 @@
           <a:p>
             <a:fld id="{2D5AC94A-39C5-4978-AAAE-8C77D16AD6DD}" type="datetimeFigureOut">
               <a:rPr lang="fr-FR" smtClean="0"/>
-              <a:t>21/04/2018</a:t>
+              <a:t>22/04/2018</a:t>
             </a:fld>
             <a:endParaRPr lang="fr-FR"/>
           </a:p>
@@ -3271,7 +3276,7 @@
           <a:p>
             <a:fld id="{6B043D1A-49E2-47B3-8AC0-9106DF2E9A6B}" type="slidenum">
               <a:rPr lang="fr-FR" smtClean="0"/>
-              <a:t>‹N°›</a:t>
+              <a:t>‹#›</a:t>
             </a:fld>
             <a:endParaRPr lang="fr-FR"/>
           </a:p>
@@ -3399,7 +3404,7 @@
           <a:p>
             <a:fld id="{2D5AC94A-39C5-4978-AAAE-8C77D16AD6DD}" type="datetimeFigureOut">
               <a:rPr lang="fr-FR" smtClean="0"/>
-              <a:t>21/04/2018</a:t>
+              <a:t>22/04/2018</a:t>
             </a:fld>
             <a:endParaRPr lang="fr-FR"/>
           </a:p>
@@ -3441,7 +3446,7 @@
           <a:p>
             <a:fld id="{6B043D1A-49E2-47B3-8AC0-9106DF2E9A6B}" type="slidenum">
               <a:rPr lang="fr-FR" smtClean="0"/>
-              <a:t>‹N°›</a:t>
+              <a:t>‹#›</a:t>
             </a:fld>
             <a:endParaRPr lang="fr-FR"/>
           </a:p>
@@ -3643,7 +3648,7 @@
           <a:p>
             <a:fld id="{2D5AC94A-39C5-4978-AAAE-8C77D16AD6DD}" type="datetimeFigureOut">
               <a:rPr lang="fr-FR" smtClean="0"/>
-              <a:t>21/04/2018</a:t>
+              <a:t>22/04/2018</a:t>
             </a:fld>
             <a:endParaRPr lang="fr-FR"/>
           </a:p>
@@ -3685,7 +3690,7 @@
           <a:p>
             <a:fld id="{6B043D1A-49E2-47B3-8AC0-9106DF2E9A6B}" type="slidenum">
               <a:rPr lang="fr-FR" smtClean="0"/>
-              <a:t>‹N°›</a:t>
+              <a:t>‹#›</a:t>
             </a:fld>
             <a:endParaRPr lang="fr-FR"/>
           </a:p>
@@ -3879,7 +3884,7 @@
           <a:p>
             <a:fld id="{2D5AC94A-39C5-4978-AAAE-8C77D16AD6DD}" type="datetimeFigureOut">
               <a:rPr lang="fr-FR" smtClean="0"/>
-              <a:t>21/04/2018</a:t>
+              <a:t>22/04/2018</a:t>
             </a:fld>
             <a:endParaRPr lang="fr-FR"/>
           </a:p>
@@ -3921,7 +3926,7 @@
           <a:p>
             <a:fld id="{6B043D1A-49E2-47B3-8AC0-9106DF2E9A6B}" type="slidenum">
               <a:rPr lang="fr-FR" smtClean="0"/>
-              <a:t>‹N°›</a:t>
+              <a:t>‹#›</a:t>
             </a:fld>
             <a:endParaRPr lang="fr-FR"/>
           </a:p>
@@ -4345,7 +4350,7 @@
           <a:p>
             <a:fld id="{2D5AC94A-39C5-4978-AAAE-8C77D16AD6DD}" type="datetimeFigureOut">
               <a:rPr lang="fr-FR" smtClean="0"/>
-              <a:t>21/04/2018</a:t>
+              <a:t>22/04/2018</a:t>
             </a:fld>
             <a:endParaRPr lang="fr-FR"/>
           </a:p>
@@ -4387,7 +4392,7 @@
           <a:p>
             <a:fld id="{6B043D1A-49E2-47B3-8AC0-9106DF2E9A6B}" type="slidenum">
               <a:rPr lang="fr-FR" smtClean="0"/>
-              <a:t>‹N°›</a:t>
+              <a:t>‹#›</a:t>
             </a:fld>
             <a:endParaRPr lang="fr-FR"/>
           </a:p>
@@ -4463,7 +4468,7 @@
           <a:p>
             <a:fld id="{2D5AC94A-39C5-4978-AAAE-8C77D16AD6DD}" type="datetimeFigureOut">
               <a:rPr lang="fr-FR" smtClean="0"/>
-              <a:t>21/04/2018</a:t>
+              <a:t>22/04/2018</a:t>
             </a:fld>
             <a:endParaRPr lang="fr-FR"/>
           </a:p>
@@ -4505,7 +4510,7 @@
           <a:p>
             <a:fld id="{6B043D1A-49E2-47B3-8AC0-9106DF2E9A6B}" type="slidenum">
               <a:rPr lang="fr-FR" smtClean="0"/>
-              <a:t>‹N°›</a:t>
+              <a:t>‹#›</a:t>
             </a:fld>
             <a:endParaRPr lang="fr-FR"/>
           </a:p>
@@ -4558,7 +4563,7 @@
           <a:p>
             <a:fld id="{2D5AC94A-39C5-4978-AAAE-8C77D16AD6DD}" type="datetimeFigureOut">
               <a:rPr lang="fr-FR" smtClean="0"/>
-              <a:t>21/04/2018</a:t>
+              <a:t>22/04/2018</a:t>
             </a:fld>
             <a:endParaRPr lang="fr-FR"/>
           </a:p>
@@ -4600,7 +4605,7 @@
           <a:p>
             <a:fld id="{6B043D1A-49E2-47B3-8AC0-9106DF2E9A6B}" type="slidenum">
               <a:rPr lang="fr-FR" smtClean="0"/>
-              <a:t>‹N°›</a:t>
+              <a:t>‹#›</a:t>
             </a:fld>
             <a:endParaRPr lang="fr-FR"/>
           </a:p>
@@ -4813,7 +4818,7 @@
           <a:p>
             <a:fld id="{2D5AC94A-39C5-4978-AAAE-8C77D16AD6DD}" type="datetimeFigureOut">
               <a:rPr lang="fr-FR" smtClean="0"/>
-              <a:t>21/04/2018</a:t>
+              <a:t>22/04/2018</a:t>
             </a:fld>
             <a:endParaRPr lang="fr-FR"/>
           </a:p>
@@ -4855,7 +4860,7 @@
           <a:p>
             <a:fld id="{6B043D1A-49E2-47B3-8AC0-9106DF2E9A6B}" type="slidenum">
               <a:rPr lang="fr-FR" smtClean="0"/>
-              <a:t>‹N°›</a:t>
+              <a:t>‹#›</a:t>
             </a:fld>
             <a:endParaRPr lang="fr-FR"/>
           </a:p>
@@ -5113,7 +5118,7 @@
           <a:p>
             <a:fld id="{2D5AC94A-39C5-4978-AAAE-8C77D16AD6DD}" type="datetimeFigureOut">
               <a:rPr lang="fr-FR" smtClean="0"/>
-              <a:t>21/04/2018</a:t>
+              <a:t>22/04/2018</a:t>
             </a:fld>
             <a:endParaRPr lang="fr-FR"/>
           </a:p>
@@ -5155,7 +5160,7 @@
           <a:p>
             <a:fld id="{6B043D1A-49E2-47B3-8AC0-9106DF2E9A6B}" type="slidenum">
               <a:rPr lang="fr-FR" smtClean="0"/>
-              <a:t>‹N°›</a:t>
+              <a:t>‹#›</a:t>
             </a:fld>
             <a:endParaRPr lang="fr-FR"/>
           </a:p>
@@ -5347,7 +5352,7 @@
           <a:p>
             <a:fld id="{2D5AC94A-39C5-4978-AAAE-8C77D16AD6DD}" type="datetimeFigureOut">
               <a:rPr lang="fr-FR" smtClean="0"/>
-              <a:t>21/04/2018</a:t>
+              <a:t>22/04/2018</a:t>
             </a:fld>
             <a:endParaRPr lang="fr-FR"/>
           </a:p>
@@ -5439,7 +5444,7 @@
           <a:p>
             <a:fld id="{6B043D1A-49E2-47B3-8AC0-9106DF2E9A6B}" type="slidenum">
               <a:rPr lang="fr-FR" smtClean="0"/>
-              <a:t>‹N°›</a:t>
+              <a:t>‹#›</a:t>
             </a:fld>
             <a:endParaRPr lang="fr-FR"/>
           </a:p>
@@ -6686,7 +6691,12 @@
             <p:ph type="title"/>
           </p:nvPr>
         </p:nvSpPr>
-        <p:spPr/>
+        <p:spPr>
+          <a:xfrm>
+            <a:off x="913794" y="236670"/>
+            <a:ext cx="10353762" cy="970450"/>
+          </a:xfrm>
+        </p:spPr>
         <p:txBody>
           <a:bodyPr/>
           <a:lstStyle/>
@@ -6698,31 +6708,41 @@
           </a:p>
         </p:txBody>
       </p:sp>
-      <p:sp>
-        <p:nvSpPr>
-          <p:cNvPr id="3" name="Espace réservé du contenu 2">
+      <p:pic>
+        <p:nvPicPr>
+          <p:cNvPr id="5" name="Content Placeholder 4">
             <a:extLst>
               <a:ext uri="{FF2B5EF4-FFF2-40B4-BE49-F238E27FC236}">
-                <a16:creationId xmlns:a16="http://schemas.microsoft.com/office/drawing/2014/main" id="{B722004A-449A-4900-B68C-CC456C064769}"/>
+                <a16:creationId xmlns:a16="http://schemas.microsoft.com/office/drawing/2014/main" id="{101BAC1D-BD66-4940-93AA-7DF9BF56B060}"/>
               </a:ext>
             </a:extLst>
           </p:cNvPr>
-          <p:cNvSpPr>
-            <a:spLocks noGrp="1"/>
-          </p:cNvSpPr>
+          <p:cNvPicPr>
+            <a:picLocks noGrp="1" noChangeAspect="1"/>
+          </p:cNvPicPr>
           <p:nvPr>
             <p:ph idx="1"/>
           </p:nvPr>
-        </p:nvSpPr>
-        <p:spPr/>
-        <p:txBody>
-          <a:bodyPr/>
-          <a:lstStyle/>
-          <a:p>
-            <a:endParaRPr lang="fr-FR"/>
-          </a:p>
-        </p:txBody>
-      </p:sp>
+        </p:nvPicPr>
+        <p:blipFill>
+          <a:blip r:embed="rId2">
+            <a:extLst>
+              <a:ext uri="{28A0092B-C50C-407E-A947-70E740481C1C}">
+                <a14:useLocalDpi xmlns:a14="http://schemas.microsoft.com/office/drawing/2010/main" val="0"/>
+              </a:ext>
+            </a:extLst>
+          </a:blip>
+          <a:stretch>
+            <a:fillRect/>
+          </a:stretch>
+        </p:blipFill>
+        <p:spPr>
+          <a:xfrm>
+            <a:off x="753160" y="1207120"/>
+            <a:ext cx="10675029" cy="5414210"/>
+          </a:xfrm>
+        </p:spPr>
+      </p:pic>
     </p:spTree>
     <p:extLst>
       <p:ext uri="{BB962C8B-B14F-4D97-AF65-F5344CB8AC3E}">

</xml_diff>